<commit_message>
Fixed and updated Docs
</commit_message>
<xml_diff>
--- a/documentation/SPAM Story Map for Milestone 1– Customer Features.pptx
+++ b/documentation/SPAM Story Map for Milestone 1– Customer Features.pptx
@@ -260,7 +260,7 @@
           <a:p>
             <a:fld id="{4DA77B4C-388B-4C9C-B58B-0F4B6CACC03B}" type="datetimeFigureOut">
               <a:rPr lang="en-US" smtClean="0"/>
-              <a:t>1/26/23</a:t>
+              <a:t>1/29/23</a:t>
             </a:fld>
             <a:endParaRPr lang="en-US"/>
           </a:p>
@@ -458,7 +458,7 @@
           <a:p>
             <a:fld id="{4DA77B4C-388B-4C9C-B58B-0F4B6CACC03B}" type="datetimeFigureOut">
               <a:rPr lang="en-US" smtClean="0"/>
-              <a:t>1/26/23</a:t>
+              <a:t>1/29/23</a:t>
             </a:fld>
             <a:endParaRPr lang="en-US"/>
           </a:p>
@@ -666,7 +666,7 @@
           <a:p>
             <a:fld id="{4DA77B4C-388B-4C9C-B58B-0F4B6CACC03B}" type="datetimeFigureOut">
               <a:rPr lang="en-US" smtClean="0"/>
-              <a:t>1/26/23</a:t>
+              <a:t>1/29/23</a:t>
             </a:fld>
             <a:endParaRPr lang="en-US"/>
           </a:p>
@@ -864,7 +864,7 @@
           <a:p>
             <a:fld id="{4DA77B4C-388B-4C9C-B58B-0F4B6CACC03B}" type="datetimeFigureOut">
               <a:rPr lang="en-US" smtClean="0"/>
-              <a:t>1/26/23</a:t>
+              <a:t>1/29/23</a:t>
             </a:fld>
             <a:endParaRPr lang="en-US"/>
           </a:p>
@@ -1139,7 +1139,7 @@
           <a:p>
             <a:fld id="{4DA77B4C-388B-4C9C-B58B-0F4B6CACC03B}" type="datetimeFigureOut">
               <a:rPr lang="en-US" smtClean="0"/>
-              <a:t>1/26/23</a:t>
+              <a:t>1/29/23</a:t>
             </a:fld>
             <a:endParaRPr lang="en-US"/>
           </a:p>
@@ -1404,7 +1404,7 @@
           <a:p>
             <a:fld id="{4DA77B4C-388B-4C9C-B58B-0F4B6CACC03B}" type="datetimeFigureOut">
               <a:rPr lang="en-US" smtClean="0"/>
-              <a:t>1/26/23</a:t>
+              <a:t>1/29/23</a:t>
             </a:fld>
             <a:endParaRPr lang="en-US"/>
           </a:p>
@@ -1816,7 +1816,7 @@
           <a:p>
             <a:fld id="{4DA77B4C-388B-4C9C-B58B-0F4B6CACC03B}" type="datetimeFigureOut">
               <a:rPr lang="en-US" smtClean="0"/>
-              <a:t>1/26/23</a:t>
+              <a:t>1/29/23</a:t>
             </a:fld>
             <a:endParaRPr lang="en-US"/>
           </a:p>
@@ -1957,7 +1957,7 @@
           <a:p>
             <a:fld id="{4DA77B4C-388B-4C9C-B58B-0F4B6CACC03B}" type="datetimeFigureOut">
               <a:rPr lang="en-US" smtClean="0"/>
-              <a:t>1/26/23</a:t>
+              <a:t>1/29/23</a:t>
             </a:fld>
             <a:endParaRPr lang="en-US"/>
           </a:p>
@@ -2070,7 +2070,7 @@
           <a:p>
             <a:fld id="{4DA77B4C-388B-4C9C-B58B-0F4B6CACC03B}" type="datetimeFigureOut">
               <a:rPr lang="en-US" smtClean="0"/>
-              <a:t>1/26/23</a:t>
+              <a:t>1/29/23</a:t>
             </a:fld>
             <a:endParaRPr lang="en-US"/>
           </a:p>
@@ -2381,7 +2381,7 @@
           <a:p>
             <a:fld id="{4DA77B4C-388B-4C9C-B58B-0F4B6CACC03B}" type="datetimeFigureOut">
               <a:rPr lang="en-US" smtClean="0"/>
-              <a:t>1/26/23</a:t>
+              <a:t>1/29/23</a:t>
             </a:fld>
             <a:endParaRPr lang="en-US"/>
           </a:p>
@@ -2669,7 +2669,7 @@
           <a:p>
             <a:fld id="{4DA77B4C-388B-4C9C-B58B-0F4B6CACC03B}" type="datetimeFigureOut">
               <a:rPr lang="en-US" smtClean="0"/>
-              <a:t>1/26/23</a:t>
+              <a:t>1/29/23</a:t>
             </a:fld>
             <a:endParaRPr lang="en-US"/>
           </a:p>
@@ -2910,7 +2910,7 @@
           <a:p>
             <a:fld id="{4DA77B4C-388B-4C9C-B58B-0F4B6CACC03B}" type="datetimeFigureOut">
               <a:rPr lang="en-US" smtClean="0"/>
-              <a:t>1/26/23</a:t>
+              <a:t>1/29/23</a:t>
             </a:fld>
             <a:endParaRPr lang="en-US"/>
           </a:p>
@@ -3622,7 +3622,7 @@
             <a:pPr algn="ctr"/>
             <a:r>
               <a:rPr lang="en-US" dirty="0"/>
-              <a:t>Set Up Automatic Updates</a:t>
+              <a:t>Load History via Parsing Engine</a:t>
             </a:r>
           </a:p>
         </p:txBody>

</xml_diff>